<commit_message>
update gitbookversie analyse het ontwikkelingsproces en schema's
</commit_message>
<xml_diff>
--- a/Scriptie/cover.pptx
+++ b/Scriptie/cover.pptx
@@ -104,6 +104,11 @@
       </a:defRPr>
     </a:lvl9pPr>
   </p:defaultTextStyle>
+  <p:extLst>
+    <p:ext uri="{EFAFB233-063F-42B5-8137-9DF3F51BA10A}">
+      <p15:sldGuideLst xmlns:p15="http://schemas.microsoft.com/office/powerpoint/2012/main" xmlns=""/>
+    </p:ext>
+  </p:extLst>
 </p:presentation>
 </file>
 
@@ -238,7 +243,8 @@
           <a:p>
             <a:fld id="{13EF79CD-D47A-4CB1-BC5B-42C041177A66}" type="datetimeFigureOut">
               <a:rPr lang="nl-BE" smtClean="0"/>
-              <a:t>9/05/2016</a:t>
+              <a:pPr/>
+              <a:t>6/05/2017</a:t>
             </a:fld>
             <a:endParaRPr lang="nl-BE"/>
           </a:p>
@@ -280,6 +286,7 @@
           <a:p>
             <a:fld id="{AF8D7881-EE66-4DC9-9A55-2DACC84444B1}" type="slidenum">
               <a:rPr lang="nl-BE" smtClean="0"/>
+              <a:pPr/>
               <a:t>‹nr.›</a:t>
             </a:fld>
             <a:endParaRPr lang="nl-BE"/>
@@ -289,7 +296,7 @@
     </p:spTree>
     <p:extLst>
       <p:ext uri="{BB962C8B-B14F-4D97-AF65-F5344CB8AC3E}">
-        <p14:creationId xmlns:p14="http://schemas.microsoft.com/office/powerpoint/2010/main" val="3611205530"/>
+        <p14:creationId xmlns:p14="http://schemas.microsoft.com/office/powerpoint/2010/main" xmlns="" val="3611205530"/>
       </p:ext>
     </p:extLst>
   </p:cSld>
@@ -408,7 +415,8 @@
           <a:p>
             <a:fld id="{13EF79CD-D47A-4CB1-BC5B-42C041177A66}" type="datetimeFigureOut">
               <a:rPr lang="nl-BE" smtClean="0"/>
-              <a:t>9/05/2016</a:t>
+              <a:pPr/>
+              <a:t>6/05/2017</a:t>
             </a:fld>
             <a:endParaRPr lang="nl-BE"/>
           </a:p>
@@ -450,6 +458,7 @@
           <a:p>
             <a:fld id="{AF8D7881-EE66-4DC9-9A55-2DACC84444B1}" type="slidenum">
               <a:rPr lang="nl-BE" smtClean="0"/>
+              <a:pPr/>
               <a:t>‹nr.›</a:t>
             </a:fld>
             <a:endParaRPr lang="nl-BE"/>
@@ -459,7 +468,7 @@
     </p:spTree>
     <p:extLst>
       <p:ext uri="{BB962C8B-B14F-4D97-AF65-F5344CB8AC3E}">
-        <p14:creationId xmlns:p14="http://schemas.microsoft.com/office/powerpoint/2010/main" val="1966472127"/>
+        <p14:creationId xmlns:p14="http://schemas.microsoft.com/office/powerpoint/2010/main" xmlns="" val="1966472127"/>
       </p:ext>
     </p:extLst>
   </p:cSld>
@@ -588,7 +597,8 @@
           <a:p>
             <a:fld id="{13EF79CD-D47A-4CB1-BC5B-42C041177A66}" type="datetimeFigureOut">
               <a:rPr lang="nl-BE" smtClean="0"/>
-              <a:t>9/05/2016</a:t>
+              <a:pPr/>
+              <a:t>6/05/2017</a:t>
             </a:fld>
             <a:endParaRPr lang="nl-BE"/>
           </a:p>
@@ -630,6 +640,7 @@
           <a:p>
             <a:fld id="{AF8D7881-EE66-4DC9-9A55-2DACC84444B1}" type="slidenum">
               <a:rPr lang="nl-BE" smtClean="0"/>
+              <a:pPr/>
               <a:t>‹nr.›</a:t>
             </a:fld>
             <a:endParaRPr lang="nl-BE"/>
@@ -639,7 +650,7 @@
     </p:spTree>
     <p:extLst>
       <p:ext uri="{BB962C8B-B14F-4D97-AF65-F5344CB8AC3E}">
-        <p14:creationId xmlns:p14="http://schemas.microsoft.com/office/powerpoint/2010/main" val="4091326108"/>
+        <p14:creationId xmlns:p14="http://schemas.microsoft.com/office/powerpoint/2010/main" xmlns="" val="4091326108"/>
       </p:ext>
     </p:extLst>
   </p:cSld>
@@ -758,7 +769,8 @@
           <a:p>
             <a:fld id="{13EF79CD-D47A-4CB1-BC5B-42C041177A66}" type="datetimeFigureOut">
               <a:rPr lang="nl-BE" smtClean="0"/>
-              <a:t>9/05/2016</a:t>
+              <a:pPr/>
+              <a:t>6/05/2017</a:t>
             </a:fld>
             <a:endParaRPr lang="nl-BE"/>
           </a:p>
@@ -800,6 +812,7 @@
           <a:p>
             <a:fld id="{AF8D7881-EE66-4DC9-9A55-2DACC84444B1}" type="slidenum">
               <a:rPr lang="nl-BE" smtClean="0"/>
+              <a:pPr/>
               <a:t>‹nr.›</a:t>
             </a:fld>
             <a:endParaRPr lang="nl-BE"/>
@@ -809,7 +822,7 @@
     </p:spTree>
     <p:extLst>
       <p:ext uri="{BB962C8B-B14F-4D97-AF65-F5344CB8AC3E}">
-        <p14:creationId xmlns:p14="http://schemas.microsoft.com/office/powerpoint/2010/main" val="57311520"/>
+        <p14:creationId xmlns:p14="http://schemas.microsoft.com/office/powerpoint/2010/main" xmlns="" val="57311520"/>
       </p:ext>
     </p:extLst>
   </p:cSld>
@@ -1002,7 +1015,8 @@
           <a:p>
             <a:fld id="{13EF79CD-D47A-4CB1-BC5B-42C041177A66}" type="datetimeFigureOut">
               <a:rPr lang="nl-BE" smtClean="0"/>
-              <a:t>9/05/2016</a:t>
+              <a:pPr/>
+              <a:t>6/05/2017</a:t>
             </a:fld>
             <a:endParaRPr lang="nl-BE"/>
           </a:p>
@@ -1044,6 +1058,7 @@
           <a:p>
             <a:fld id="{AF8D7881-EE66-4DC9-9A55-2DACC84444B1}" type="slidenum">
               <a:rPr lang="nl-BE" smtClean="0"/>
+              <a:pPr/>
               <a:t>‹nr.›</a:t>
             </a:fld>
             <a:endParaRPr lang="nl-BE"/>
@@ -1053,7 +1068,7 @@
     </p:spTree>
     <p:extLst>
       <p:ext uri="{BB962C8B-B14F-4D97-AF65-F5344CB8AC3E}">
-        <p14:creationId xmlns:p14="http://schemas.microsoft.com/office/powerpoint/2010/main" val="4018755420"/>
+        <p14:creationId xmlns:p14="http://schemas.microsoft.com/office/powerpoint/2010/main" xmlns="" val="4018755420"/>
       </p:ext>
     </p:extLst>
   </p:cSld>
@@ -1234,7 +1249,8 @@
           <a:p>
             <a:fld id="{13EF79CD-D47A-4CB1-BC5B-42C041177A66}" type="datetimeFigureOut">
               <a:rPr lang="nl-BE" smtClean="0"/>
-              <a:t>9/05/2016</a:t>
+              <a:pPr/>
+              <a:t>6/05/2017</a:t>
             </a:fld>
             <a:endParaRPr lang="nl-BE"/>
           </a:p>
@@ -1276,6 +1292,7 @@
           <a:p>
             <a:fld id="{AF8D7881-EE66-4DC9-9A55-2DACC84444B1}" type="slidenum">
               <a:rPr lang="nl-BE" smtClean="0"/>
+              <a:pPr/>
               <a:t>‹nr.›</a:t>
             </a:fld>
             <a:endParaRPr lang="nl-BE"/>
@@ -1285,7 +1302,7 @@
     </p:spTree>
     <p:extLst>
       <p:ext uri="{BB962C8B-B14F-4D97-AF65-F5344CB8AC3E}">
-        <p14:creationId xmlns:p14="http://schemas.microsoft.com/office/powerpoint/2010/main" val="3502881563"/>
+        <p14:creationId xmlns:p14="http://schemas.microsoft.com/office/powerpoint/2010/main" xmlns="" val="3502881563"/>
       </p:ext>
     </p:extLst>
   </p:cSld>
@@ -1601,7 +1618,8 @@
           <a:p>
             <a:fld id="{13EF79CD-D47A-4CB1-BC5B-42C041177A66}" type="datetimeFigureOut">
               <a:rPr lang="nl-BE" smtClean="0"/>
-              <a:t>9/05/2016</a:t>
+              <a:pPr/>
+              <a:t>6/05/2017</a:t>
             </a:fld>
             <a:endParaRPr lang="nl-BE"/>
           </a:p>
@@ -1643,6 +1661,7 @@
           <a:p>
             <a:fld id="{AF8D7881-EE66-4DC9-9A55-2DACC84444B1}" type="slidenum">
               <a:rPr lang="nl-BE" smtClean="0"/>
+              <a:pPr/>
               <a:t>‹nr.›</a:t>
             </a:fld>
             <a:endParaRPr lang="nl-BE"/>
@@ -1652,7 +1671,7 @@
     </p:spTree>
     <p:extLst>
       <p:ext uri="{BB962C8B-B14F-4D97-AF65-F5344CB8AC3E}">
-        <p14:creationId xmlns:p14="http://schemas.microsoft.com/office/powerpoint/2010/main" val="4166143722"/>
+        <p14:creationId xmlns:p14="http://schemas.microsoft.com/office/powerpoint/2010/main" xmlns="" val="4166143722"/>
       </p:ext>
     </p:extLst>
   </p:cSld>
@@ -1719,7 +1738,8 @@
           <a:p>
             <a:fld id="{13EF79CD-D47A-4CB1-BC5B-42C041177A66}" type="datetimeFigureOut">
               <a:rPr lang="nl-BE" smtClean="0"/>
-              <a:t>9/05/2016</a:t>
+              <a:pPr/>
+              <a:t>6/05/2017</a:t>
             </a:fld>
             <a:endParaRPr lang="nl-BE"/>
           </a:p>
@@ -1761,6 +1781,7 @@
           <a:p>
             <a:fld id="{AF8D7881-EE66-4DC9-9A55-2DACC84444B1}" type="slidenum">
               <a:rPr lang="nl-BE" smtClean="0"/>
+              <a:pPr/>
               <a:t>‹nr.›</a:t>
             </a:fld>
             <a:endParaRPr lang="nl-BE"/>
@@ -1770,7 +1791,7 @@
     </p:spTree>
     <p:extLst>
       <p:ext uri="{BB962C8B-B14F-4D97-AF65-F5344CB8AC3E}">
-        <p14:creationId xmlns:p14="http://schemas.microsoft.com/office/powerpoint/2010/main" val="3041463397"/>
+        <p14:creationId xmlns:p14="http://schemas.microsoft.com/office/powerpoint/2010/main" xmlns="" val="3041463397"/>
       </p:ext>
     </p:extLst>
   </p:cSld>
@@ -1814,7 +1835,8 @@
           <a:p>
             <a:fld id="{13EF79CD-D47A-4CB1-BC5B-42C041177A66}" type="datetimeFigureOut">
               <a:rPr lang="nl-BE" smtClean="0"/>
-              <a:t>9/05/2016</a:t>
+              <a:pPr/>
+              <a:t>6/05/2017</a:t>
             </a:fld>
             <a:endParaRPr lang="nl-BE"/>
           </a:p>
@@ -1856,6 +1878,7 @@
           <a:p>
             <a:fld id="{AF8D7881-EE66-4DC9-9A55-2DACC84444B1}" type="slidenum">
               <a:rPr lang="nl-BE" smtClean="0"/>
+              <a:pPr/>
               <a:t>‹nr.›</a:t>
             </a:fld>
             <a:endParaRPr lang="nl-BE"/>
@@ -1865,7 +1888,7 @@
     </p:spTree>
     <p:extLst>
       <p:ext uri="{BB962C8B-B14F-4D97-AF65-F5344CB8AC3E}">
-        <p14:creationId xmlns:p14="http://schemas.microsoft.com/office/powerpoint/2010/main" val="2730185506"/>
+        <p14:creationId xmlns:p14="http://schemas.microsoft.com/office/powerpoint/2010/main" xmlns="" val="2730185506"/>
       </p:ext>
     </p:extLst>
   </p:cSld>
@@ -2091,7 +2114,8 @@
           <a:p>
             <a:fld id="{13EF79CD-D47A-4CB1-BC5B-42C041177A66}" type="datetimeFigureOut">
               <a:rPr lang="nl-BE" smtClean="0"/>
-              <a:t>9/05/2016</a:t>
+              <a:pPr/>
+              <a:t>6/05/2017</a:t>
             </a:fld>
             <a:endParaRPr lang="nl-BE"/>
           </a:p>
@@ -2133,6 +2157,7 @@
           <a:p>
             <a:fld id="{AF8D7881-EE66-4DC9-9A55-2DACC84444B1}" type="slidenum">
               <a:rPr lang="nl-BE" smtClean="0"/>
+              <a:pPr/>
               <a:t>‹nr.›</a:t>
             </a:fld>
             <a:endParaRPr lang="nl-BE"/>
@@ -2142,7 +2167,7 @@
     </p:spTree>
     <p:extLst>
       <p:ext uri="{BB962C8B-B14F-4D97-AF65-F5344CB8AC3E}">
-        <p14:creationId xmlns:p14="http://schemas.microsoft.com/office/powerpoint/2010/main" val="2405420156"/>
+        <p14:creationId xmlns:p14="http://schemas.microsoft.com/office/powerpoint/2010/main" xmlns="" val="2405420156"/>
       </p:ext>
     </p:extLst>
   </p:cSld>
@@ -2348,7 +2373,8 @@
           <a:p>
             <a:fld id="{13EF79CD-D47A-4CB1-BC5B-42C041177A66}" type="datetimeFigureOut">
               <a:rPr lang="nl-BE" smtClean="0"/>
-              <a:t>9/05/2016</a:t>
+              <a:pPr/>
+              <a:t>6/05/2017</a:t>
             </a:fld>
             <a:endParaRPr lang="nl-BE"/>
           </a:p>
@@ -2390,6 +2416,7 @@
           <a:p>
             <a:fld id="{AF8D7881-EE66-4DC9-9A55-2DACC84444B1}" type="slidenum">
               <a:rPr lang="nl-BE" smtClean="0"/>
+              <a:pPr/>
               <a:t>‹nr.›</a:t>
             </a:fld>
             <a:endParaRPr lang="nl-BE"/>
@@ -2399,7 +2426,7 @@
     </p:spTree>
     <p:extLst>
       <p:ext uri="{BB962C8B-B14F-4D97-AF65-F5344CB8AC3E}">
-        <p14:creationId xmlns:p14="http://schemas.microsoft.com/office/powerpoint/2010/main" val="2630477136"/>
+        <p14:creationId xmlns:p14="http://schemas.microsoft.com/office/powerpoint/2010/main" xmlns="" val="2630477136"/>
       </p:ext>
     </p:extLst>
   </p:cSld>
@@ -2561,7 +2588,8 @@
           <a:p>
             <a:fld id="{13EF79CD-D47A-4CB1-BC5B-42C041177A66}" type="datetimeFigureOut">
               <a:rPr lang="nl-BE" smtClean="0"/>
-              <a:t>9/05/2016</a:t>
+              <a:pPr/>
+              <a:t>6/05/2017</a:t>
             </a:fld>
             <a:endParaRPr lang="nl-BE"/>
           </a:p>
@@ -2639,6 +2667,7 @@
           <a:p>
             <a:fld id="{AF8D7881-EE66-4DC9-9A55-2DACC84444B1}" type="slidenum">
               <a:rPr lang="nl-BE" smtClean="0"/>
+              <a:pPr/>
               <a:t>‹nr.›</a:t>
             </a:fld>
             <a:endParaRPr lang="nl-BE"/>
@@ -2648,7 +2677,7 @@
     </p:spTree>
     <p:extLst>
       <p:ext uri="{BB962C8B-B14F-4D97-AF65-F5344CB8AC3E}">
-        <p14:creationId xmlns:p14="http://schemas.microsoft.com/office/powerpoint/2010/main" val="1674170853"/>
+        <p14:creationId xmlns:p14="http://schemas.microsoft.com/office/powerpoint/2010/main" xmlns="" val="1674170853"/>
       </p:ext>
     </p:extLst>
   </p:cSld>
@@ -3045,10 +3074,10 @@
           <p:nvPr/>
         </p:nvPicPr>
         <p:blipFill>
-          <a:blip r:embed="rId2">
+          <a:blip r:embed="rId2" cstate="print">
             <a:extLst>
               <a:ext uri="{28A0092B-C50C-407E-A947-70E740481C1C}">
-                <a14:useLocalDpi xmlns:a14="http://schemas.microsoft.com/office/drawing/2010/main" val="0"/>
+                <a14:useLocalDpi xmlns:a14="http://schemas.microsoft.com/office/drawing/2010/main" xmlns="" val="0"/>
               </a:ext>
             </a:extLst>
           </a:blip>
@@ -3068,7 +3097,7 @@
           <a:noFill/>
           <a:extLst>
             <a:ext uri="{909E8E84-426E-40DD-AFC4-6F175D3DCCD1}">
-              <a14:hiddenFill xmlns:a14="http://schemas.microsoft.com/office/drawing/2010/main">
+              <a14:hiddenFill xmlns:a14="http://schemas.microsoft.com/office/drawing/2010/main" xmlns="">
                 <a:solidFill>
                   <a:srgbClr val="FFFFFF"/>
                 </a:solidFill>
@@ -3127,7 +3156,7 @@
           <a:blip r:embed="rId4" cstate="print">
             <a:extLst>
               <a:ext uri="{28A0092B-C50C-407E-A947-70E740481C1C}">
-                <a14:useLocalDpi xmlns:a14="http://schemas.microsoft.com/office/drawing/2010/main" val="0"/>
+                <a14:useLocalDpi xmlns:a14="http://schemas.microsoft.com/office/drawing/2010/main" xmlns="" val="0"/>
               </a:ext>
             </a:extLst>
           </a:blip>
@@ -3147,7 +3176,7 @@
           <a:noFill/>
           <a:extLst>
             <a:ext uri="{909E8E84-426E-40DD-AFC4-6F175D3DCCD1}">
-              <a14:hiddenFill xmlns:a14="http://schemas.microsoft.com/office/drawing/2010/main">
+              <a14:hiddenFill xmlns:a14="http://schemas.microsoft.com/office/drawing/2010/main" xmlns="">
                 <a:solidFill>
                   <a:srgbClr val="FFFFFF"/>
                 </a:solidFill>
@@ -3179,14 +3208,14 @@
           <a:effectLst/>
           <a:extLst>
             <a:ext uri="{909E8E84-426E-40DD-AFC4-6F175D3DCCD1}">
-              <a14:hiddenFill xmlns:a14="http://schemas.microsoft.com/office/drawing/2010/main">
+              <a14:hiddenFill xmlns:a14="http://schemas.microsoft.com/office/drawing/2010/main" xmlns="">
                 <a:solidFill>
                   <a:schemeClr val="accent1"/>
                 </a:solidFill>
               </a14:hiddenFill>
             </a:ext>
             <a:ext uri="{91240B29-F687-4F45-9708-019B960494DF}">
-              <a14:hiddenLine xmlns:a14="http://schemas.microsoft.com/office/drawing/2010/main" w="9525">
+              <a14:hiddenLine xmlns:a14="http://schemas.microsoft.com/office/drawing/2010/main" xmlns="" w="9525">
                 <a:solidFill>
                   <a:schemeClr val="tx1"/>
                 </a:solidFill>
@@ -3196,7 +3225,7 @@
               </a14:hiddenLine>
             </a:ext>
             <a:ext uri="{AF507438-7753-43E0-B8FC-AC1667EBCBE1}">
-              <a14:hiddenEffects xmlns:a14="http://schemas.microsoft.com/office/drawing/2010/main">
+              <a14:hiddenEffects xmlns:a14="http://schemas.microsoft.com/office/drawing/2010/main" xmlns="">
                 <a:effectLst>
                   <a:outerShdw dist="35921" dir="2700000" algn="ctr" rotWithShape="0">
                     <a:schemeClr val="bg2"/>
@@ -3242,14 +3271,14 @@
           <a:effectLst/>
           <a:extLst>
             <a:ext uri="{909E8E84-426E-40DD-AFC4-6F175D3DCCD1}">
-              <a14:hiddenFill xmlns:a14="http://schemas.microsoft.com/office/drawing/2010/main">
+              <a14:hiddenFill xmlns:a14="http://schemas.microsoft.com/office/drawing/2010/main" xmlns="">
                 <a:solidFill>
                   <a:schemeClr val="accent1"/>
                 </a:solidFill>
               </a14:hiddenFill>
             </a:ext>
             <a:ext uri="{91240B29-F687-4F45-9708-019B960494DF}">
-              <a14:hiddenLine xmlns:a14="http://schemas.microsoft.com/office/drawing/2010/main" w="9525">
+              <a14:hiddenLine xmlns:a14="http://schemas.microsoft.com/office/drawing/2010/main" xmlns="" w="9525">
                 <a:solidFill>
                   <a:schemeClr val="tx1"/>
                 </a:solidFill>
@@ -3259,7 +3288,7 @@
               </a14:hiddenLine>
             </a:ext>
             <a:ext uri="{AF507438-7753-43E0-B8FC-AC1667EBCBE1}">
-              <a14:hiddenEffects xmlns:a14="http://schemas.microsoft.com/office/drawing/2010/main">
+              <a14:hiddenEffects xmlns:a14="http://schemas.microsoft.com/office/drawing/2010/main" xmlns="">
                 <a:effectLst>
                   <a:outerShdw dist="35921" dir="2700000" algn="ctr" rotWithShape="0">
                     <a:schemeClr val="bg2"/>
@@ -3348,14 +3377,14 @@
           <a:effectLst/>
           <a:extLst>
             <a:ext uri="{909E8E84-426E-40DD-AFC4-6F175D3DCCD1}">
-              <a14:hiddenFill xmlns:a14="http://schemas.microsoft.com/office/drawing/2010/main">
+              <a14:hiddenFill xmlns:a14="http://schemas.microsoft.com/office/drawing/2010/main" xmlns="">
                 <a:solidFill>
                   <a:schemeClr val="accent1"/>
                 </a:solidFill>
               </a14:hiddenFill>
             </a:ext>
             <a:ext uri="{91240B29-F687-4F45-9708-019B960494DF}">
-              <a14:hiddenLine xmlns:a14="http://schemas.microsoft.com/office/drawing/2010/main" w="9525">
+              <a14:hiddenLine xmlns:a14="http://schemas.microsoft.com/office/drawing/2010/main" xmlns="" w="9525">
                 <a:solidFill>
                   <a:schemeClr val="tx1"/>
                 </a:solidFill>
@@ -3365,7 +3394,7 @@
               </a14:hiddenLine>
             </a:ext>
             <a:ext uri="{AF507438-7753-43E0-B8FC-AC1667EBCBE1}">
-              <a14:hiddenEffects xmlns:a14="http://schemas.microsoft.com/office/drawing/2010/main">
+              <a14:hiddenEffects xmlns:a14="http://schemas.microsoft.com/office/drawing/2010/main" xmlns="">
                 <a:effectLst>
                   <a:outerShdw dist="35921" dir="2700000" algn="ctr" rotWithShape="0">
                     <a:schemeClr val="bg2"/>
@@ -3411,14 +3440,14 @@
           <a:effectLst/>
           <a:extLst>
             <a:ext uri="{909E8E84-426E-40DD-AFC4-6F175D3DCCD1}">
-              <a14:hiddenFill xmlns:a14="http://schemas.microsoft.com/office/drawing/2010/main">
+              <a14:hiddenFill xmlns:a14="http://schemas.microsoft.com/office/drawing/2010/main" xmlns="">
                 <a:solidFill>
                   <a:schemeClr val="accent1"/>
                 </a:solidFill>
               </a14:hiddenFill>
             </a:ext>
             <a:ext uri="{91240B29-F687-4F45-9708-019B960494DF}">
-              <a14:hiddenLine xmlns:a14="http://schemas.microsoft.com/office/drawing/2010/main" w="9525">
+              <a14:hiddenLine xmlns:a14="http://schemas.microsoft.com/office/drawing/2010/main" xmlns="" w="9525">
                 <a:solidFill>
                   <a:schemeClr val="tx1"/>
                 </a:solidFill>
@@ -3428,7 +3457,7 @@
               </a14:hiddenLine>
             </a:ext>
             <a:ext uri="{AF507438-7753-43E0-B8FC-AC1667EBCBE1}">
-              <a14:hiddenEffects xmlns:a14="http://schemas.microsoft.com/office/drawing/2010/main">
+              <a14:hiddenEffects xmlns:a14="http://schemas.microsoft.com/office/drawing/2010/main" xmlns="">
                 <a:effectLst>
                   <a:outerShdw dist="35921" dir="2700000" algn="ctr" rotWithShape="0">
                     <a:schemeClr val="bg2"/>
@@ -3460,7 +3489,7 @@
         <p:spPr>
           <a:xfrm>
             <a:off x="-3691" y="1432294"/>
-            <a:ext cx="6840140" cy="810478"/>
+            <a:ext cx="6840140" cy="1190069"/>
           </a:xfrm>
           <a:prstGeom prst="rect">
             <a:avLst/>
@@ -3473,47 +3502,48 @@
           <a:lstStyle/>
           <a:p>
             <a:pPr algn="ctr">
-              <a:lnSpc>
-                <a:spcPts val="1400"/>
-              </a:lnSpc>
               <a:spcAft>
                 <a:spcPts val="0"/>
               </a:spcAft>
             </a:pPr>
             <a:r>
-              <a:rPr lang="nl-NL" sz="4000" dirty="0" smtClean="0">
+              <a:rPr lang="nl-BE" sz="2400" dirty="0" smtClean="0">
                 <a:solidFill>
                   <a:schemeClr val="bg1"/>
                 </a:solidFill>
-                <a:effectLst/>
               </a:rPr>
-              <a:t> </a:t>
-            </a:r>
-            <a:endParaRPr lang="nl-BE" sz="800" dirty="0" smtClean="0">
+              <a:t>Smartbuildings </a:t>
+            </a:r>
+            <a:r>
+              <a:rPr lang="nl-BE" sz="2400" dirty="0">
+                <a:solidFill>
+                  <a:schemeClr val="bg1"/>
+                </a:solidFill>
+              </a:rPr>
+              <a:t>@ Digipolis: De bezettingsgraad van </a:t>
+            </a:r>
+            <a:r>
+              <a:rPr lang="nl-BE" sz="2400" dirty="0" smtClean="0">
+                <a:solidFill>
+                  <a:schemeClr val="bg1"/>
+                </a:solidFill>
+              </a:rPr>
+              <a:t>conferentieruimtes </a:t>
+            </a:r>
+            <a:r>
+              <a:rPr lang="nl-BE" sz="2400" dirty="0">
+                <a:solidFill>
+                  <a:schemeClr val="bg1"/>
+                </a:solidFill>
+              </a:rPr>
+              <a:t>optimaliseren</a:t>
+            </a:r>
+            <a:endParaRPr lang="nl-NL" sz="2400" dirty="0" smtClean="0">
               <a:solidFill>
                 <a:schemeClr val="bg1"/>
               </a:solidFill>
               <a:effectLst/>
             </a:endParaRPr>
-          </a:p>
-          <a:p>
-            <a:pPr algn="ctr">
-              <a:lnSpc>
-                <a:spcPts val="1400"/>
-              </a:lnSpc>
-              <a:spcAft>
-                <a:spcPts val="0"/>
-              </a:spcAft>
-            </a:pPr>
-            <a:r>
-              <a:rPr lang="nl-NL" sz="4000" dirty="0" smtClean="0">
-                <a:solidFill>
-                  <a:schemeClr val="bg1"/>
-                </a:solidFill>
-                <a:effectLst/>
-              </a:rPr>
-              <a:t>Scriptietitel</a:t>
-            </a:r>
           </a:p>
           <a:p>
             <a:pPr algn="ctr">
@@ -3541,12 +3571,12 @@
               </a:spcAft>
             </a:pPr>
             <a:r>
-              <a:rPr lang="nl-NL" dirty="0">
+              <a:rPr lang="nl-NL" dirty="0" smtClean="0">
                 <a:solidFill>
                   <a:schemeClr val="bg1"/>
                 </a:solidFill>
               </a:rPr>
-              <a:t>naam student 1, naam student 2</a:t>
+              <a:t>Chris Jansen</a:t>
             </a:r>
             <a:endParaRPr lang="nl-BE" sz="800" dirty="0">
               <a:solidFill>
@@ -3591,9 +3621,26 @@
                 <a:solidFill>
                   <a:schemeClr val="bg1"/>
                 </a:solidFill>
+              </a:rPr>
+              <a:t>A</a:t>
+            </a:r>
+            <a:r>
+              <a:rPr lang="nl-NL" sz="1200" smtClean="0">
+                <a:solidFill>
+                  <a:schemeClr val="bg1"/>
+                </a:solidFill>
                 <a:effectLst/>
               </a:rPr>
-              <a:t>academiejaar 2015-2016</a:t>
+              <a:t>cademiejaar </a:t>
+            </a:r>
+            <a:r>
+              <a:rPr lang="nl-NL" sz="1200" dirty="0" smtClean="0">
+                <a:solidFill>
+                  <a:schemeClr val="bg1"/>
+                </a:solidFill>
+                <a:effectLst/>
+              </a:rPr>
+              <a:t>2016-2017</a:t>
             </a:r>
             <a:endParaRPr lang="nl-BE" sz="1200" dirty="0" smtClean="0">
               <a:solidFill>
@@ -3710,7 +3757,7 @@
     </p:spTree>
     <p:extLst>
       <p:ext uri="{BB962C8B-B14F-4D97-AF65-F5344CB8AC3E}">
-        <p14:creationId xmlns:p14="http://schemas.microsoft.com/office/powerpoint/2010/main" val="4019046135"/>
+        <p14:creationId xmlns:p14="http://schemas.microsoft.com/office/powerpoint/2010/main" xmlns="" val="4019046135"/>
       </p:ext>
     </p:extLst>
   </p:cSld>
@@ -3770,7 +3817,7 @@
     </a:clrScheme>
     <a:fontScheme name="Kantoorthema">
       <a:majorFont>
-        <a:latin typeface="Calibri Light" panose="020F0302020204030204"/>
+        <a:latin typeface="Calibri Light"/>
         <a:ea typeface=""/>
         <a:cs typeface=""/>
         <a:font script="Jpan" typeface="游ゴシック Light"/>
@@ -3805,7 +3852,7 @@
         <a:font script="Geor" typeface="Sylfaen"/>
       </a:majorFont>
       <a:minorFont>
-        <a:latin typeface="Calibri" panose="020F0502020204030204"/>
+        <a:latin typeface="Calibri"/>
         <a:ea typeface=""/>
         <a:cs typeface=""/>
         <a:font script="Jpan" typeface="游ゴシック"/>
@@ -3982,7 +4029,7 @@
   <a:extraClrSchemeLst/>
   <a:extLst>
     <a:ext uri="{05A4C25C-085E-4340-85A3-A5531E510DB2}">
-      <thm15:themeFamily xmlns:thm15="http://schemas.microsoft.com/office/thememl/2012/main" name="Office Theme" id="{62F939B6-93AF-4DB8-9C6B-D6C7DFDC589F}" vid="{4A3C46E8-61CC-4603-A589-7422A47A8E4A}"/>
+      <thm15:themeFamily xmlns:thm15="http://schemas.microsoft.com/office/thememl/2012/main" xmlns="" name="Office Theme" id="{62F939B6-93AF-4DB8-9C6B-D6C7DFDC589F}" vid="{4A3C46E8-61CC-4603-A589-7422A47A8E4A}"/>
     </a:ext>
   </a:extLst>
 </a:theme>

</xml_diff>